<commit_message>
Update AutoCompleteLogic class diagram
</commit_message>
<xml_diff>
--- a/docs/diagrams/AutoCompleteLogicComponentClassDiagram.pptx
+++ b/docs/diagrams/AutoCompleteLogicComponentClassDiagram.pptx
@@ -3463,7 +3463,7 @@
             </a:avLst>
           </a:prstGeom>
           <a:solidFill>
-            <a:srgbClr val="FFFF40"/>
+            <a:srgbClr val="FFFF80"/>
           </a:solidFill>
           <a:ln w="19050">
             <a:noFill/>
@@ -3674,8 +3674,8 @@
         </p:nvSpPr>
         <p:spPr>
           <a:xfrm>
-            <a:off x="1103085" y="4777355"/>
-            <a:ext cx="7050315" cy="328045"/>
+            <a:off x="1103086" y="4777355"/>
+            <a:ext cx="3392934" cy="328045"/>
           </a:xfrm>
           <a:prstGeom prst="roundRect">
             <a:avLst/>
@@ -4989,6 +4989,117 @@
           </a:p>
         </p:txBody>
       </p:sp>
+      <p:sp>
+        <p:nvSpPr>
+          <p:cNvPr id="34" name="Rectangle 65">
+            <a:extLst>
+              <a:ext uri="{FF2B5EF4-FFF2-40B4-BE49-F238E27FC236}">
+                <a16:creationId xmlns:a16="http://schemas.microsoft.com/office/drawing/2014/main" id="{FC96584E-7058-46F9-858B-C26490699434}"/>
+              </a:ext>
+            </a:extLst>
+          </p:cNvPr>
+          <p:cNvSpPr/>
+          <p:nvPr/>
+        </p:nvSpPr>
+        <p:spPr>
+          <a:xfrm>
+            <a:off x="4677403" y="4777355"/>
+            <a:ext cx="3475997" cy="328045"/>
+          </a:xfrm>
+          <a:prstGeom prst="roundRect">
+            <a:avLst/>
+          </a:prstGeom>
+          <a:solidFill>
+            <a:schemeClr val="accent4">
+              <a:lumMod val="20000"/>
+              <a:lumOff val="80000"/>
+            </a:schemeClr>
+          </a:solidFill>
+          <a:ln w="19050">
+            <a:noFill/>
+          </a:ln>
+          <a:effectLst/>
+        </p:spPr>
+        <p:style>
+          <a:lnRef idx="1">
+            <a:schemeClr val="accent2"/>
+          </a:lnRef>
+          <a:fillRef idx="2">
+            <a:schemeClr val="accent2"/>
+          </a:fillRef>
+          <a:effectRef idx="1">
+            <a:schemeClr val="accent2"/>
+          </a:effectRef>
+          <a:fontRef idx="minor">
+            <a:schemeClr val="dk1"/>
+          </a:fontRef>
+        </p:style>
+        <p:txBody>
+          <a:bodyPr rtlCol="0" anchor="ctr"/>
+          <a:lstStyle/>
+          <a:p>
+            <a:pPr algn="ctr"/>
+            <a:r>
+              <a:rPr lang="en-US" sz="1100" b="1" dirty="0">
+                <a:solidFill>
+                  <a:schemeClr val="bg1"/>
+                </a:solidFill>
+              </a:rPr>
+              <a:t>Logic</a:t>
+            </a:r>
+          </a:p>
+        </p:txBody>
+      </p:sp>
+      <p:cxnSp>
+        <p:nvCxnSpPr>
+          <p:cNvPr id="35" name="Elbow Connector 122">
+            <a:extLst>
+              <a:ext uri="{FF2B5EF4-FFF2-40B4-BE49-F238E27FC236}">
+                <a16:creationId xmlns:a16="http://schemas.microsoft.com/office/drawing/2014/main" id="{0D6E84C9-AA84-46C5-9AA2-D428F6F8D339}"/>
+              </a:ext>
+            </a:extLst>
+          </p:cNvPr>
+          <p:cNvCxnSpPr>
+            <a:cxnSpLocks/>
+            <a:stCxn id="42" idx="2"/>
+            <a:endCxn id="9" idx="0"/>
+          </p:cNvCxnSpPr>
+          <p:nvPr/>
+        </p:nvCxnSpPr>
+        <p:spPr>
+          <a:xfrm rot="5400000">
+            <a:off x="3143548" y="2733571"/>
+            <a:ext cx="1699789" cy="2387778"/>
+          </a:xfrm>
+          <a:prstGeom prst="bentConnector3">
+            <a:avLst>
+              <a:gd name="adj1" fmla="val 83062"/>
+            </a:avLst>
+          </a:prstGeom>
+          <a:ln w="19050">
+            <a:solidFill>
+              <a:srgbClr val="AACC00"/>
+            </a:solidFill>
+            <a:prstDash val="solid"/>
+            <a:headEnd type="none" w="med" len="med"/>
+            <a:tailEnd type="arrow" w="med" len="med"/>
+          </a:ln>
+        </p:spPr>
+        <p:style>
+          <a:lnRef idx="1">
+            <a:schemeClr val="dk1"/>
+          </a:lnRef>
+          <a:fillRef idx="0">
+            <a:schemeClr val="dk1"/>
+          </a:fillRef>
+          <a:effectRef idx="0">
+            <a:schemeClr val="dk1"/>
+          </a:effectRef>
+          <a:fontRef idx="minor">
+            <a:schemeClr val="tx1"/>
+          </a:fontRef>
+        </p:style>
+      </p:cxnSp>
     </p:spTree>
     <p:extLst>
       <p:ext uri="{BB962C8B-B14F-4D97-AF65-F5344CB8AC3E}">

</xml_diff>